<commit_message>
Finish intro to class.
</commit_message>
<xml_diff>
--- a/Presentations/Class 03 - Sept 18.pptx
+++ b/Presentations/Class 03 - Sept 18.pptx
@@ -11,8 +11,9 @@
     <p:sldId id="259" r:id="rId5"/>
     <p:sldId id="260" r:id="rId6"/>
     <p:sldId id="261" r:id="rId7"/>
-    <p:sldId id="262" r:id="rId8"/>
-    <p:sldId id="263" r:id="rId9"/>
+    <p:sldId id="264" r:id="rId8"/>
+    <p:sldId id="262" r:id="rId9"/>
+    <p:sldId id="263" r:id="rId10"/>
   </p:sldIdLst>
   <p:sldSz cx="12192000" cy="6858000"/>
   <p:notesSz cx="6858000" cy="9144000"/>
@@ -111,7 +112,16 @@
       </a:defRPr>
     </a:lvl9pPr>
   </p:defaultTextStyle>
+  <p:extLst>
+    <p:ext uri="{EFAFB233-063F-42B5-8137-9DF3F51BA10A}">
+      <p15:sldGuideLst xmlns:p15="http://schemas.microsoft.com/office/powerpoint/2012/main"/>
+    </p:ext>
+  </p:extLst>
 </p:presentation>
+</file>
+
+<file path=ppt/revisionInfo.xml><?xml version="1.0" encoding="utf-8"?>
+<p1510:revInfo xmlns:a="http://schemas.openxmlformats.org/drawingml/2006/main" xmlns:r="http://schemas.openxmlformats.org/officeDocument/2006/relationships" xmlns:p1510="http://schemas.microsoft.com/office/powerpoint/2015/10/main"/>
 </file>
 
 <file path=ppt/slideLayouts/slideLayout1.xml><?xml version="1.0" encoding="utf-8"?>
@@ -245,7 +255,7 @@
           <a:p>
             <a:fld id="{000A609A-DCE5-4FA9-AC51-40D8AC71B180}" type="datetimeFigureOut">
               <a:rPr lang="en-US" smtClean="0"/>
-              <a:t>9/11/2017</a:t>
+              <a:t>9/17/2017</a:t>
             </a:fld>
             <a:endParaRPr lang="en-US"/>
           </a:p>
@@ -415,7 +425,7 @@
           <a:p>
             <a:fld id="{000A609A-DCE5-4FA9-AC51-40D8AC71B180}" type="datetimeFigureOut">
               <a:rPr lang="en-US" smtClean="0"/>
-              <a:t>9/11/2017</a:t>
+              <a:t>9/17/2017</a:t>
             </a:fld>
             <a:endParaRPr lang="en-US"/>
           </a:p>
@@ -595,7 +605,7 @@
           <a:p>
             <a:fld id="{000A609A-DCE5-4FA9-AC51-40D8AC71B180}" type="datetimeFigureOut">
               <a:rPr lang="en-US" smtClean="0"/>
-              <a:t>9/11/2017</a:t>
+              <a:t>9/17/2017</a:t>
             </a:fld>
             <a:endParaRPr lang="en-US"/>
           </a:p>
@@ -765,7 +775,7 @@
           <a:p>
             <a:fld id="{000A609A-DCE5-4FA9-AC51-40D8AC71B180}" type="datetimeFigureOut">
               <a:rPr lang="en-US" smtClean="0"/>
-              <a:t>9/11/2017</a:t>
+              <a:t>9/17/2017</a:t>
             </a:fld>
             <a:endParaRPr lang="en-US"/>
           </a:p>
@@ -1011,7 +1021,7 @@
           <a:p>
             <a:fld id="{000A609A-DCE5-4FA9-AC51-40D8AC71B180}" type="datetimeFigureOut">
               <a:rPr lang="en-US" smtClean="0"/>
-              <a:t>9/11/2017</a:t>
+              <a:t>9/17/2017</a:t>
             </a:fld>
             <a:endParaRPr lang="en-US"/>
           </a:p>
@@ -1243,7 +1253,7 @@
           <a:p>
             <a:fld id="{000A609A-DCE5-4FA9-AC51-40D8AC71B180}" type="datetimeFigureOut">
               <a:rPr lang="en-US" smtClean="0"/>
-              <a:t>9/11/2017</a:t>
+              <a:t>9/17/2017</a:t>
             </a:fld>
             <a:endParaRPr lang="en-US"/>
           </a:p>
@@ -1610,7 +1620,7 @@
           <a:p>
             <a:fld id="{000A609A-DCE5-4FA9-AC51-40D8AC71B180}" type="datetimeFigureOut">
               <a:rPr lang="en-US" smtClean="0"/>
-              <a:t>9/11/2017</a:t>
+              <a:t>9/17/2017</a:t>
             </a:fld>
             <a:endParaRPr lang="en-US"/>
           </a:p>
@@ -1728,7 +1738,7 @@
           <a:p>
             <a:fld id="{000A609A-DCE5-4FA9-AC51-40D8AC71B180}" type="datetimeFigureOut">
               <a:rPr lang="en-US" smtClean="0"/>
-              <a:t>9/11/2017</a:t>
+              <a:t>9/17/2017</a:t>
             </a:fld>
             <a:endParaRPr lang="en-US"/>
           </a:p>
@@ -1823,7 +1833,7 @@
           <a:p>
             <a:fld id="{000A609A-DCE5-4FA9-AC51-40D8AC71B180}" type="datetimeFigureOut">
               <a:rPr lang="en-US" smtClean="0"/>
-              <a:t>9/11/2017</a:t>
+              <a:t>9/17/2017</a:t>
             </a:fld>
             <a:endParaRPr lang="en-US"/>
           </a:p>
@@ -2100,7 +2110,7 @@
           <a:p>
             <a:fld id="{000A609A-DCE5-4FA9-AC51-40D8AC71B180}" type="datetimeFigureOut">
               <a:rPr lang="en-US" smtClean="0"/>
-              <a:t>9/11/2017</a:t>
+              <a:t>9/17/2017</a:t>
             </a:fld>
             <a:endParaRPr lang="en-US"/>
           </a:p>
@@ -2357,7 +2367,7 @@
           <a:p>
             <a:fld id="{000A609A-DCE5-4FA9-AC51-40D8AC71B180}" type="datetimeFigureOut">
               <a:rPr lang="en-US" smtClean="0"/>
-              <a:t>9/11/2017</a:t>
+              <a:t>9/17/2017</a:t>
             </a:fld>
             <a:endParaRPr lang="en-US"/>
           </a:p>
@@ -2570,7 +2580,7 @@
           <a:p>
             <a:fld id="{000A609A-DCE5-4FA9-AC51-40D8AC71B180}" type="datetimeFigureOut">
               <a:rPr lang="en-US" smtClean="0"/>
-              <a:t>9/11/2017</a:t>
+              <a:t>9/17/2017</a:t>
             </a:fld>
             <a:endParaRPr lang="en-US"/>
           </a:p>
@@ -3940,13 +3950,42 @@
           <a:p>
             <a:r>
               <a:rPr lang="en-US" dirty="0"/>
-              <a:t>Handouts?</a:t>
+              <a:t>Handouts? </a:t>
+            </a:r>
+            <a:r>
+              <a:rPr lang="en-US" dirty="0">
+                <a:hlinkClick r:id="rId2"/>
+              </a:rPr>
+              <a:t>https://github.com/crhallberg/IMM120</a:t>
+            </a:r>
+            <a:endParaRPr lang="en-US" dirty="0"/>
+          </a:p>
+          <a:p>
+            <a:pPr lvl="1"/>
+            <a:r>
+              <a:rPr lang="en-US" dirty="0"/>
+              <a:t>will try to put on Canvas before class</a:t>
             </a:r>
           </a:p>
           <a:p>
             <a:r>
               <a:rPr lang="en-US" dirty="0"/>
               <a:t>Is it ok to go off and code something different?</a:t>
+            </a:r>
+          </a:p>
+          <a:p>
+            <a:pPr lvl="1"/>
+            <a:r>
+              <a:rPr lang="en-US" dirty="0"/>
+              <a:t>Yes, </a:t>
+            </a:r>
+            <a:r>
+              <a:rPr lang="en-US" i="1" dirty="0"/>
+              <a:t>but you must be coding</a:t>
+            </a:r>
+            <a:r>
+              <a:rPr lang="en-US" dirty="0"/>
+              <a:t>!</a:t>
             </a:r>
           </a:p>
           <a:p>
@@ -3989,6 +4028,147 @@
           <p:cNvPr id="2" name="Title 1">
             <a:extLst>
               <a:ext uri="{FF2B5EF4-FFF2-40B4-BE49-F238E27FC236}">
+                <a16:creationId xmlns:a16="http://schemas.microsoft.com/office/drawing/2014/main" id="{A0AA04E6-10DF-4B0B-9645-09F4D08542F8}"/>
+              </a:ext>
+            </a:extLst>
+          </p:cNvPr>
+          <p:cNvSpPr>
+            <a:spLocks noGrp="1"/>
+          </p:cNvSpPr>
+          <p:nvPr>
+            <p:ph type="title"/>
+          </p:nvPr>
+        </p:nvSpPr>
+        <p:spPr/>
+        <p:txBody>
+          <a:bodyPr/>
+          <a:lstStyle/>
+          <a:p>
+            <a:r>
+              <a:rPr lang="en-US"/>
+              <a:t>Previously, </a:t>
+            </a:r>
+            <a:r>
+              <a:rPr lang="en-US" dirty="0"/>
+              <a:t>in IMM120</a:t>
+            </a:r>
+          </a:p>
+        </p:txBody>
+      </p:sp>
+      <p:sp>
+        <p:nvSpPr>
+          <p:cNvPr id="3" name="Content Placeholder 2">
+            <a:extLst>
+              <a:ext uri="{FF2B5EF4-FFF2-40B4-BE49-F238E27FC236}">
+                <a16:creationId xmlns:a16="http://schemas.microsoft.com/office/drawing/2014/main" id="{FEC9AAF6-F53F-44FD-922A-040293FF3558}"/>
+              </a:ext>
+            </a:extLst>
+          </p:cNvPr>
+          <p:cNvSpPr>
+            <a:spLocks noGrp="1"/>
+          </p:cNvSpPr>
+          <p:nvPr>
+            <p:ph idx="1"/>
+          </p:nvPr>
+        </p:nvSpPr>
+        <p:spPr/>
+        <p:txBody>
+          <a:bodyPr/>
+          <a:lstStyle/>
+          <a:p>
+            <a:pPr marL="0" indent="0">
+              <a:buNone/>
+            </a:pPr>
+            <a:r>
+              <a:rPr lang="en-US" b="1" dirty="0"/>
+              <a:t>Buzzer beaters</a:t>
+            </a:r>
+          </a:p>
+          <a:p>
+            <a:endParaRPr lang="en-US" b="1" dirty="0"/>
+          </a:p>
+          <a:p>
+            <a:r>
+              <a:rPr lang="en-US" dirty="0"/>
+              <a:t>I may have misspoke last week:</a:t>
+            </a:r>
+          </a:p>
+          <a:p>
+            <a:pPr lvl="1"/>
+            <a:r>
+              <a:rPr lang="en-US" dirty="0"/>
+              <a:t>If you hand in an assignment that </a:t>
+            </a:r>
+            <a:r>
+              <a:rPr lang="en-US" b="1" dirty="0"/>
+              <a:t>clearly shows work</a:t>
+            </a:r>
+            <a:r>
+              <a:rPr lang="en-US" dirty="0"/>
+              <a:t>, I’m not going to hold it against you.</a:t>
+            </a:r>
+          </a:p>
+          <a:p>
+            <a:pPr lvl="1"/>
+            <a:r>
+              <a:rPr lang="en-US" b="1" dirty="0"/>
+              <a:t>Please email me if you’re not sure of the assignment or your idea.</a:t>
+            </a:r>
+          </a:p>
+          <a:p>
+            <a:pPr lvl="1"/>
+            <a:endParaRPr lang="en-US" b="1" dirty="0"/>
+          </a:p>
+          <a:p>
+            <a:pPr lvl="1"/>
+            <a:endParaRPr lang="en-US" b="1" dirty="0"/>
+          </a:p>
+          <a:p>
+            <a:pPr marL="0" indent="0">
+              <a:buNone/>
+            </a:pPr>
+            <a:r>
+              <a:rPr lang="en-US" sz="2000" i="1" dirty="0"/>
+              <a:t>PS. You can turn in your assignments by putting your links on Canvas</a:t>
+            </a:r>
+          </a:p>
+        </p:txBody>
+      </p:sp>
+    </p:spTree>
+    <p:extLst>
+      <p:ext uri="{BB962C8B-B14F-4D97-AF65-F5344CB8AC3E}">
+        <p14:creationId xmlns:p14="http://schemas.microsoft.com/office/powerpoint/2010/main" val="623276421"/>
+      </p:ext>
+    </p:extLst>
+  </p:cSld>
+  <p:clrMapOvr>
+    <a:masterClrMapping/>
+  </p:clrMapOvr>
+</p:sld>
+</file>
+
+<file path=ppt/slides/slide8.xml><?xml version="1.0" encoding="utf-8"?>
+<p:sld xmlns:a="http://schemas.openxmlformats.org/drawingml/2006/main" xmlns:r="http://schemas.openxmlformats.org/officeDocument/2006/relationships" xmlns:p="http://schemas.openxmlformats.org/presentationml/2006/main">
+  <p:cSld>
+    <p:spTree>
+      <p:nvGrpSpPr>
+        <p:cNvPr id="1" name=""/>
+        <p:cNvGrpSpPr/>
+        <p:nvPr/>
+      </p:nvGrpSpPr>
+      <p:grpSpPr>
+        <a:xfrm>
+          <a:off x="0" y="0"/>
+          <a:ext cx="0" cy="0"/>
+          <a:chOff x="0" y="0"/>
+          <a:chExt cx="0" cy="0"/>
+        </a:xfrm>
+      </p:grpSpPr>
+      <p:sp>
+        <p:nvSpPr>
+          <p:cNvPr id="2" name="Title 1">
+            <a:extLst>
+              <a:ext uri="{FF2B5EF4-FFF2-40B4-BE49-F238E27FC236}">
                 <a16:creationId xmlns:a16="http://schemas.microsoft.com/office/drawing/2014/main" id="{1B302ACB-707E-4DB7-B6BA-86D3EEAC9095}"/>
               </a:ext>
             </a:extLst>
@@ -4156,7 +4336,7 @@
 </p:sld>
 </file>
 
-<file path=ppt/slides/slide8.xml><?xml version="1.0" encoding="utf-8"?>
+<file path=ppt/slides/slide9.xml><?xml version="1.0" encoding="utf-8"?>
 <p:sld xmlns:a="http://schemas.openxmlformats.org/drawingml/2006/main" xmlns:r="http://schemas.openxmlformats.org/officeDocument/2006/relationships" xmlns:p="http://schemas.openxmlformats.org/presentationml/2006/main">
   <p:cSld>
     <p:spTree>

</xml_diff>